<commit_message>
Update presentation deck with latest changes
</commit_message>
<xml_diff>
--- a/presentations/Sentiment_Analysis_of_Tweets_Directed_at_Appl_Google_Products.pptx
+++ b/presentations/Sentiment_Analysis_of_Tweets_Directed_at_Appl_Google_Products.pptx
@@ -7,7 +7,7 @@
     <p:sldMasterId id="2147483670" r:id="rId3"/>
   </p:sldMasterIdLst>
   <p:notesMasterIdLst>
-    <p:notesMasterId r:id="rId18"/>
+    <p:notesMasterId r:id="rId19"/>
   </p:notesMasterIdLst>
   <p:sldIdLst>
     <p:sldId id="259" r:id="rId4"/>
@@ -23,34 +23,35 @@
     <p:sldId id="1220" r:id="rId14"/>
     <p:sldId id="1224" r:id="rId15"/>
     <p:sldId id="1226" r:id="rId16"/>
-    <p:sldId id="1201" r:id="rId17"/>
+    <p:sldId id="1230" r:id="rId17"/>
+    <p:sldId id="1201" r:id="rId18"/>
   </p:sldIdLst>
   <p:sldSz cx="12192000" cy="6858000"/>
   <p:notesSz cx="6858000" cy="9144000"/>
   <p:embeddedFontLst>
     <p:embeddedFont>
       <p:font typeface="Manrope" panose="020B0604020202020204" charset="0"/>
-      <p:regular r:id="rId19"/>
-      <p:bold r:id="rId20"/>
+      <p:regular r:id="rId20"/>
+      <p:bold r:id="rId21"/>
     </p:embeddedFont>
     <p:embeddedFont>
       <p:font typeface="Merriweather" panose="00000500000000000000" pitchFamily="2" charset="0"/>
-      <p:regular r:id="rId21"/>
-      <p:bold r:id="rId22"/>
-      <p:italic r:id="rId23"/>
-      <p:boldItalic r:id="rId24"/>
+      <p:regular r:id="rId22"/>
+      <p:bold r:id="rId23"/>
+      <p:italic r:id="rId24"/>
+      <p:boldItalic r:id="rId25"/>
     </p:embeddedFont>
     <p:embeddedFont>
       <p:font typeface="Play" panose="020B0604020202020204" charset="0"/>
-      <p:regular r:id="rId25"/>
-      <p:bold r:id="rId26"/>
+      <p:regular r:id="rId26"/>
+      <p:bold r:id="rId27"/>
     </p:embeddedFont>
     <p:embeddedFont>
       <p:font typeface="Source Sans Pro" panose="020B0503030403020204" pitchFamily="34" charset="0"/>
-      <p:regular r:id="rId27"/>
-      <p:bold r:id="rId28"/>
-      <p:italic r:id="rId29"/>
-      <p:boldItalic r:id="rId30"/>
+      <p:regular r:id="rId28"/>
+      <p:bold r:id="rId29"/>
+      <p:italic r:id="rId30"/>
+      <p:boldItalic r:id="rId31"/>
     </p:embeddedFont>
   </p:embeddedFontLst>
   <p:defaultTextStyle>
@@ -2034,6 +2035,262 @@
     <p:extLst>
       <p:ext uri="{BB962C8B-B14F-4D97-AF65-F5344CB8AC3E}">
         <p14:creationId xmlns:p14="http://schemas.microsoft.com/office/powerpoint/2010/main" val="1023556515"/>
+      </p:ext>
+    </p:extLst>
+  </p:cSld>
+  <p:clrMapOvr>
+    <a:masterClrMapping/>
+  </p:clrMapOvr>
+</p:notes>
+</file>
+
+<file path=ppt/notesSlides/notesSlide13.xml><?xml version="1.0" encoding="utf-8"?>
+<p:notes xmlns:a="http://schemas.openxmlformats.org/drawingml/2006/main" xmlns:r="http://schemas.openxmlformats.org/officeDocument/2006/relationships" xmlns:p="http://schemas.openxmlformats.org/presentationml/2006/main" showMasterSp="0" showMasterPhAnim="0">
+  <p:cSld>
+    <p:spTree>
+      <p:nvGrpSpPr>
+        <p:cNvPr id="1" name="Shape 144">
+          <a:extLst>
+            <a:ext uri="{FF2B5EF4-FFF2-40B4-BE49-F238E27FC236}">
+              <a16:creationId xmlns:a16="http://schemas.microsoft.com/office/drawing/2014/main" id="{3108EB0D-6397-509E-025D-6834D22BF7DB}"/>
+            </a:ext>
+          </a:extLst>
+        </p:cNvPr>
+        <p:cNvGrpSpPr/>
+        <p:nvPr/>
+      </p:nvGrpSpPr>
+      <p:grpSpPr>
+        <a:xfrm>
+          <a:off x="0" y="0"/>
+          <a:ext cx="0" cy="0"/>
+          <a:chOff x="0" y="0"/>
+          <a:chExt cx="0" cy="0"/>
+        </a:xfrm>
+      </p:grpSpPr>
+      <p:sp>
+        <p:nvSpPr>
+          <p:cNvPr id="145" name="Google Shape;145;p28:notes">
+            <a:extLst>
+              <a:ext uri="{FF2B5EF4-FFF2-40B4-BE49-F238E27FC236}">
+                <a16:creationId xmlns:a16="http://schemas.microsoft.com/office/drawing/2014/main" id="{D2314883-3FE5-7ED5-6080-BC2CC7E2FD1B}"/>
+              </a:ext>
+            </a:extLst>
+          </p:cNvPr>
+          <p:cNvSpPr>
+            <a:spLocks noGrp="1" noRot="1" noChangeAspect="1"/>
+          </p:cNvSpPr>
+          <p:nvPr>
+            <p:ph type="sldImg" idx="2"/>
+          </p:nvPr>
+        </p:nvSpPr>
+        <p:spPr>
+          <a:xfrm>
+            <a:off x="685800" y="1143000"/>
+            <a:ext cx="5486400" cy="3086100"/>
+          </a:xfrm>
+          <a:custGeom>
+            <a:avLst/>
+            <a:gdLst/>
+            <a:ahLst/>
+            <a:cxnLst/>
+            <a:rect l="l" t="t" r="r" b="b"/>
+            <a:pathLst>
+              <a:path w="120000" h="120000" extrusionOk="0">
+                <a:moveTo>
+                  <a:pt x="0" y="0"/>
+                </a:moveTo>
+                <a:lnTo>
+                  <a:pt x="120000" y="0"/>
+                </a:lnTo>
+                <a:lnTo>
+                  <a:pt x="120000" y="120000"/>
+                </a:lnTo>
+                <a:lnTo>
+                  <a:pt x="0" y="120000"/>
+                </a:lnTo>
+                <a:close/>
+              </a:path>
+            </a:pathLst>
+          </a:custGeom>
+          <a:noFill/>
+          <a:ln w="12700" cap="flat" cmpd="sng">
+            <a:solidFill>
+              <a:srgbClr val="000000"/>
+            </a:solidFill>
+            <a:prstDash val="solid"/>
+            <a:round/>
+            <a:headEnd type="none" w="sm" len="sm"/>
+            <a:tailEnd type="none" w="sm" len="sm"/>
+          </a:ln>
+        </p:spPr>
+      </p:sp>
+      <p:sp>
+        <p:nvSpPr>
+          <p:cNvPr id="146" name="Google Shape;146;p28:notes">
+            <a:extLst>
+              <a:ext uri="{FF2B5EF4-FFF2-40B4-BE49-F238E27FC236}">
+                <a16:creationId xmlns:a16="http://schemas.microsoft.com/office/drawing/2014/main" id="{CE581226-9C17-A90F-7FC7-A09FB13E3544}"/>
+              </a:ext>
+            </a:extLst>
+          </p:cNvPr>
+          <p:cNvSpPr txBox="1">
+            <a:spLocks noGrp="1"/>
+          </p:cNvSpPr>
+          <p:nvPr>
+            <p:ph type="body" idx="1"/>
+          </p:nvPr>
+        </p:nvSpPr>
+        <p:spPr>
+          <a:xfrm>
+            <a:off x="685800" y="4400550"/>
+            <a:ext cx="5486400" cy="3600450"/>
+          </a:xfrm>
+          <a:prstGeom prst="rect">
+            <a:avLst/>
+          </a:prstGeom>
+          <a:noFill/>
+          <a:ln>
+            <a:noFill/>
+          </a:ln>
+        </p:spPr>
+        <p:txBody>
+          <a:bodyPr spcFirstLastPara="1" wrap="square" lIns="91425" tIns="45700" rIns="91425" bIns="45700" anchor="t" anchorCtr="0">
+            <a:noAutofit/>
+          </a:bodyPr>
+          <a:lstStyle/>
+          <a:p>
+            <a:pPr marL="0" lvl="0" indent="0" algn="l" rtl="0">
+              <a:lnSpc>
+                <a:spcPct val="100000"/>
+              </a:lnSpc>
+              <a:spcBef>
+                <a:spcPts val="0"/>
+              </a:spcBef>
+              <a:spcAft>
+                <a:spcPts val="0"/>
+              </a:spcAft>
+              <a:buClr>
+                <a:schemeClr val="dk1"/>
+              </a:buClr>
+              <a:buSzPts val="1200"/>
+              <a:buFont typeface="Calibri"/>
+              <a:buNone/>
+            </a:pPr>
+            <a:endParaRPr/>
+          </a:p>
+        </p:txBody>
+      </p:sp>
+      <p:sp>
+        <p:nvSpPr>
+          <p:cNvPr id="147" name="Google Shape;147;p28:notes">
+            <a:extLst>
+              <a:ext uri="{FF2B5EF4-FFF2-40B4-BE49-F238E27FC236}">
+                <a16:creationId xmlns:a16="http://schemas.microsoft.com/office/drawing/2014/main" id="{3EFB0835-87BF-EC94-028E-70CB9FDD3EB0}"/>
+              </a:ext>
+            </a:extLst>
+          </p:cNvPr>
+          <p:cNvSpPr txBox="1">
+            <a:spLocks noGrp="1"/>
+          </p:cNvSpPr>
+          <p:nvPr>
+            <p:ph type="sldNum" idx="12"/>
+          </p:nvPr>
+        </p:nvSpPr>
+        <p:spPr>
+          <a:xfrm>
+            <a:off x="3884613" y="8685213"/>
+            <a:ext cx="2971800" cy="458787"/>
+          </a:xfrm>
+          <a:prstGeom prst="rect">
+            <a:avLst/>
+          </a:prstGeom>
+          <a:noFill/>
+          <a:ln>
+            <a:noFill/>
+          </a:ln>
+        </p:spPr>
+        <p:txBody>
+          <a:bodyPr spcFirstLastPara="1" wrap="square" lIns="91425" tIns="45700" rIns="91425" bIns="45700" anchor="b" anchorCtr="0">
+            <a:noAutofit/>
+          </a:bodyPr>
+          <a:lstStyle/>
+          <a:p>
+            <a:pPr marL="0" marR="0" lvl="0" indent="0" algn="r" defTabSz="914400" rtl="0" eaLnBrk="1" fontAlgn="auto" latinLnBrk="0" hangingPunct="1">
+              <a:lnSpc>
+                <a:spcPct val="100000"/>
+              </a:lnSpc>
+              <a:spcBef>
+                <a:spcPts val="0"/>
+              </a:spcBef>
+              <a:spcAft>
+                <a:spcPts val="0"/>
+              </a:spcAft>
+              <a:buClr>
+                <a:srgbClr val="000000"/>
+              </a:buClr>
+              <a:buSzPts val="1200"/>
+              <a:buFont typeface="Calibri"/>
+              <a:buNone/>
+              <a:tabLst/>
+              <a:defRPr/>
+            </a:pPr>
+            <a:fld id="{00000000-1234-1234-1234-123412341234}" type="slidenum">
+              <a:rPr kumimoji="0" lang="en-US" sz="1400" b="0" i="0" u="none" strike="noStrike" kern="0" cap="none" spc="0" normalizeH="0" baseline="0" noProof="0">
+                <a:ln>
+                  <a:noFill/>
+                </a:ln>
+                <a:solidFill>
+                  <a:srgbClr val="000000"/>
+                </a:solidFill>
+                <a:effectLst/>
+                <a:uLnTx/>
+                <a:uFillTx/>
+                <a:latin typeface="Arial"/>
+                <a:cs typeface="Arial"/>
+                <a:sym typeface="Arial"/>
+              </a:rPr>
+              <a:pPr marL="0" marR="0" lvl="0" indent="0" algn="r" defTabSz="914400" rtl="0" eaLnBrk="1" fontAlgn="auto" latinLnBrk="0" hangingPunct="1">
+                <a:lnSpc>
+                  <a:spcPct val="100000"/>
+                </a:lnSpc>
+                <a:spcBef>
+                  <a:spcPts val="0"/>
+                </a:spcBef>
+                <a:spcAft>
+                  <a:spcPts val="0"/>
+                </a:spcAft>
+                <a:buClr>
+                  <a:srgbClr val="000000"/>
+                </a:buClr>
+                <a:buSzPts val="1200"/>
+                <a:buFont typeface="Calibri"/>
+                <a:buNone/>
+                <a:tabLst/>
+                <a:defRPr/>
+              </a:pPr>
+              <a:t>14</a:t>
+            </a:fld>
+            <a:endParaRPr kumimoji="0" sz="1400" b="0" i="0" u="none" strike="noStrike" kern="0" cap="none" spc="0" normalizeH="0" baseline="0" noProof="0">
+              <a:ln>
+                <a:noFill/>
+              </a:ln>
+              <a:solidFill>
+                <a:srgbClr val="000000"/>
+              </a:solidFill>
+              <a:effectLst/>
+              <a:uLnTx/>
+              <a:uFillTx/>
+              <a:latin typeface="Arial"/>
+              <a:cs typeface="Arial"/>
+              <a:sym typeface="Arial"/>
+            </a:endParaRPr>
+          </a:p>
+        </p:txBody>
+      </p:sp>
+    </p:spTree>
+    <p:extLst>
+      <p:ext uri="{BB962C8B-B14F-4D97-AF65-F5344CB8AC3E}">
+        <p14:creationId xmlns:p14="http://schemas.microsoft.com/office/powerpoint/2010/main" val="2909202797"/>
       </p:ext>
     </p:extLst>
   </p:cSld>
@@ -18034,7 +18291,7 @@
         </p:nvSpPr>
         <p:spPr>
           <a:xfrm>
-            <a:off x="6823357" y="1947895"/>
+            <a:off x="6767641" y="1469249"/>
             <a:ext cx="4733581" cy="307777"/>
           </a:xfrm>
           <a:prstGeom prst="roundRect">
@@ -18069,23 +18326,7 @@
           <a:bodyPr rtlCol="0" anchor="ctr"/>
           <a:lstStyle/>
           <a:p>
-            <a:pPr marL="0" marR="0" lvl="0" indent="0" algn="ctr" defTabSz="914400" rtl="0" eaLnBrk="1" fontAlgn="auto" latinLnBrk="0" hangingPunct="1">
-              <a:lnSpc>
-                <a:spcPct val="100000"/>
-              </a:lnSpc>
-              <a:spcBef>
-                <a:spcPts val="0"/>
-              </a:spcBef>
-              <a:spcAft>
-                <a:spcPts val="0"/>
-              </a:spcAft>
-              <a:buClr>
-                <a:srgbClr val="000000"/>
-              </a:buClr>
-              <a:buSzTx/>
-              <a:buFont typeface="Arial"/>
-              <a:buNone/>
-              <a:tabLst/>
+            <a:pPr lvl="0" algn="ctr">
               <a:defRPr/>
             </a:pPr>
             <a:r>
@@ -18095,23 +18336,8 @@
                 </a:solidFill>
                 <a:latin typeface="Rooney Regular" panose="020F0503040306060404" pitchFamily="34" charset="77"/>
               </a:rPr>
-              <a:t>Model Benchmarking</a:t>
+              <a:t>Model Benchmarking for the Binary Data</a:t>
             </a:r>
-            <a:endParaRPr kumimoji="0" lang="en-US" sz="1400" b="1" i="0" u="none" strike="noStrike" kern="0" cap="none" spc="0" normalizeH="0" baseline="0" noProof="0" dirty="0">
-              <a:ln>
-                <a:noFill/>
-              </a:ln>
-              <a:solidFill>
-                <a:srgbClr val="FF0000"/>
-              </a:solidFill>
-              <a:effectLst/>
-              <a:uLnTx/>
-              <a:uFillTx/>
-              <a:latin typeface="Rooney Regular" panose="020F0503040306060404" pitchFamily="34" charset="77"/>
-              <a:ea typeface="+mn-ea"/>
-              <a:cs typeface="+mn-cs"/>
-              <a:sym typeface="Arial"/>
-            </a:endParaRPr>
           </a:p>
         </p:txBody>
       </p:sp>
@@ -18129,8 +18355,8 @@
         </p:nvSpPr>
         <p:spPr>
           <a:xfrm>
-            <a:off x="6698611" y="2263482"/>
-            <a:ext cx="4858327" cy="1384995"/>
+            <a:off x="6809612" y="1812368"/>
+            <a:ext cx="5087157" cy="5262979"/>
           </a:xfrm>
           <a:prstGeom prst="rect">
             <a:avLst/>
@@ -18185,6 +18411,160 @@
               <a:rPr lang="en-US" dirty="0"/>
               <a:t>Visualization: Logistic Regression outperformed others</a:t>
             </a:r>
+          </a:p>
+          <a:p>
+            <a:pPr marL="285750" lvl="0" indent="-285750">
+              <a:buFont typeface="Arial" panose="020B0604020202020204" pitchFamily="34" charset="0"/>
+              <a:buChar char="•"/>
+              <a:defRPr/>
+            </a:pPr>
+            <a:endParaRPr lang="en-US" dirty="0"/>
+          </a:p>
+          <a:p>
+            <a:pPr marL="285750" lvl="0" indent="-285750">
+              <a:buFont typeface="Arial" panose="020B0604020202020204" pitchFamily="34" charset="0"/>
+              <a:buChar char="•"/>
+              <a:defRPr/>
+            </a:pPr>
+            <a:endParaRPr lang="en-US" dirty="0"/>
+          </a:p>
+          <a:p>
+            <a:pPr marL="285750" lvl="0" indent="-285750">
+              <a:buFont typeface="Arial" panose="020B0604020202020204" pitchFamily="34" charset="0"/>
+              <a:buChar char="•"/>
+              <a:defRPr/>
+            </a:pPr>
+            <a:endParaRPr lang="en-US" dirty="0"/>
+          </a:p>
+          <a:p>
+            <a:pPr marL="285750" lvl="0" indent="-285750">
+              <a:buFont typeface="Arial" panose="020B0604020202020204" pitchFamily="34" charset="0"/>
+              <a:buChar char="•"/>
+              <a:defRPr/>
+            </a:pPr>
+            <a:r>
+              <a:rPr lang="en-US" dirty="0"/>
+              <a:t>Cross-validation performed across models.</a:t>
+            </a:r>
+          </a:p>
+          <a:p>
+            <a:pPr marL="285750" lvl="0" indent="-285750">
+              <a:buFont typeface="Arial" panose="020B0604020202020204" pitchFamily="34" charset="0"/>
+              <a:buChar char="•"/>
+              <a:defRPr/>
+            </a:pPr>
+            <a:r>
+              <a:rPr lang="en-US" dirty="0"/>
+              <a:t>Best model achieved ~68% accuracy.</a:t>
+            </a:r>
+          </a:p>
+          <a:p>
+            <a:pPr marL="285750" lvl="0" indent="-285750">
+              <a:buFont typeface="Arial" panose="020B0604020202020204" pitchFamily="34" charset="0"/>
+              <a:buChar char="•"/>
+              <a:defRPr/>
+            </a:pPr>
+            <a:r>
+              <a:rPr lang="en-US" dirty="0"/>
+              <a:t>Neutral class showed strongest performance (F1 ~0.74).</a:t>
+            </a:r>
+          </a:p>
+          <a:p>
+            <a:pPr marL="285750" lvl="0" indent="-285750">
+              <a:buFont typeface="Arial" panose="020B0604020202020204" pitchFamily="34" charset="0"/>
+              <a:buChar char="•"/>
+              <a:defRPr/>
+            </a:pPr>
+            <a:r>
+              <a:rPr lang="en-US" dirty="0"/>
+              <a:t>Model struggled with minority classes, especially Negative (F1 ~0.43).</a:t>
+            </a:r>
+          </a:p>
+          <a:p>
+            <a:pPr marL="285750" lvl="0" indent="-285750">
+              <a:buFont typeface="Arial" panose="020B0604020202020204" pitchFamily="34" charset="0"/>
+              <a:buChar char="•"/>
+              <a:defRPr/>
+            </a:pPr>
+            <a:r>
+              <a:rPr lang="en-US" dirty="0"/>
+              <a:t>Visualization: performance skewed toward Neutral due to class imbalance.</a:t>
+            </a:r>
+          </a:p>
+          <a:p>
+            <a:pPr marL="285750" lvl="0" indent="-285750">
+              <a:buFont typeface="Arial" panose="020B0604020202020204" pitchFamily="34" charset="0"/>
+              <a:buChar char="•"/>
+              <a:defRPr/>
+            </a:pPr>
+            <a:endParaRPr lang="en-US" dirty="0"/>
+          </a:p>
+          <a:p>
+            <a:pPr marL="285750" lvl="0" indent="-285750">
+              <a:buFont typeface="Arial" panose="020B0604020202020204" pitchFamily="34" charset="0"/>
+              <a:buChar char="•"/>
+              <a:defRPr/>
+            </a:pPr>
+            <a:endParaRPr lang="en-US" dirty="0"/>
+          </a:p>
+          <a:p>
+            <a:pPr marL="285750" lvl="0" indent="-285750">
+              <a:buFont typeface="Arial" panose="020B0604020202020204" pitchFamily="34" charset="0"/>
+              <a:buChar char="•"/>
+              <a:defRPr/>
+            </a:pPr>
+            <a:endParaRPr lang="en-US" dirty="0"/>
+          </a:p>
+          <a:p>
+            <a:pPr marL="285750" lvl="0" indent="-285750">
+              <a:buFont typeface="Arial" panose="020B0604020202020204" pitchFamily="34" charset="0"/>
+              <a:buChar char="•"/>
+              <a:defRPr/>
+            </a:pPr>
+            <a:endParaRPr lang="en-US" dirty="0"/>
+          </a:p>
+          <a:p>
+            <a:pPr marL="285750" lvl="0" indent="-285750">
+              <a:buFont typeface="Arial" panose="020B0604020202020204" pitchFamily="34" charset="0"/>
+              <a:buChar char="•"/>
+              <a:defRPr/>
+            </a:pPr>
+            <a:endParaRPr lang="en-US" dirty="0"/>
+          </a:p>
+          <a:p>
+            <a:pPr marL="285750" lvl="0" indent="-285750">
+              <a:buFont typeface="Arial" panose="020B0604020202020204" pitchFamily="34" charset="0"/>
+              <a:buChar char="•"/>
+              <a:defRPr/>
+            </a:pPr>
+            <a:endParaRPr lang="en-US" dirty="0"/>
+          </a:p>
+          <a:p>
+            <a:pPr marL="285750" lvl="0" indent="-285750">
+              <a:buFont typeface="Arial" panose="020B0604020202020204" pitchFamily="34" charset="0"/>
+              <a:buChar char="•"/>
+              <a:defRPr/>
+            </a:pPr>
+            <a:endParaRPr lang="en-US" dirty="0">
+              <a:latin typeface="Avenir Next" panose="020B0503020202020204" pitchFamily="34" charset="0"/>
+            </a:endParaRPr>
+          </a:p>
+          <a:p>
+            <a:pPr marL="285750" lvl="0" indent="-285750">
+              <a:buFont typeface="Arial" panose="020B0604020202020204" pitchFamily="34" charset="0"/>
+              <a:buChar char="•"/>
+              <a:defRPr/>
+            </a:pPr>
+            <a:endParaRPr lang="en-US" dirty="0">
+              <a:latin typeface="Avenir Next" panose="020B0503020202020204" pitchFamily="34" charset="0"/>
+            </a:endParaRPr>
+          </a:p>
+          <a:p>
+            <a:pPr marL="285750" lvl="0" indent="-285750">
+              <a:buFont typeface="Arial" panose="020B0604020202020204" pitchFamily="34" charset="0"/>
+              <a:buChar char="•"/>
+              <a:defRPr/>
+            </a:pPr>
             <a:endParaRPr lang="en-US" dirty="0">
               <a:latin typeface="Avenir Next" panose="020B0503020202020204" pitchFamily="34" charset="0"/>
             </a:endParaRPr>
@@ -18208,7 +18588,7 @@
         </p:nvSpPr>
         <p:spPr>
           <a:xfrm>
-            <a:off x="6311710" y="623655"/>
+            <a:off x="6443743" y="774469"/>
             <a:ext cx="5381376" cy="5610687"/>
           </a:xfrm>
           <a:prstGeom prst="rect">
@@ -18228,6 +18608,70 @@
           <a:lstStyle/>
           <a:p>
             <a:endParaRPr lang="en-KE" dirty="0"/>
+          </a:p>
+        </p:txBody>
+      </p:sp>
+      <p:sp>
+        <p:nvSpPr>
+          <p:cNvPr id="2" name="Rounded Rectangle 19">
+            <a:extLst>
+              <a:ext uri="{FF2B5EF4-FFF2-40B4-BE49-F238E27FC236}">
+                <a16:creationId xmlns:a16="http://schemas.microsoft.com/office/drawing/2014/main" id="{ECECFE6E-7A33-CA70-E7FE-A828494BEBE7}"/>
+              </a:ext>
+            </a:extLst>
+          </p:cNvPr>
+          <p:cNvSpPr/>
+          <p:nvPr/>
+        </p:nvSpPr>
+        <p:spPr>
+          <a:xfrm>
+            <a:off x="6809612" y="2957005"/>
+            <a:ext cx="4733581" cy="307777"/>
+          </a:xfrm>
+          <a:prstGeom prst="roundRect">
+            <a:avLst>
+              <a:gd name="adj" fmla="val 27536"/>
+            </a:avLst>
+          </a:prstGeom>
+          <a:solidFill>
+            <a:srgbClr val="D8E6D9"/>
+          </a:solidFill>
+          <a:ln>
+            <a:noFill/>
+          </a:ln>
+        </p:spPr>
+        <p:style>
+          <a:lnRef idx="2">
+            <a:schemeClr val="accent1">
+              <a:shade val="15000"/>
+            </a:schemeClr>
+          </a:lnRef>
+          <a:fillRef idx="1">
+            <a:schemeClr val="accent1"/>
+          </a:fillRef>
+          <a:effectRef idx="0">
+            <a:schemeClr val="accent1"/>
+          </a:effectRef>
+          <a:fontRef idx="minor">
+            <a:schemeClr val="lt1"/>
+          </a:fontRef>
+        </p:style>
+        <p:txBody>
+          <a:bodyPr rtlCol="0" anchor="ctr"/>
+          <a:lstStyle/>
+          <a:p>
+            <a:pPr lvl="0" algn="ctr">
+              <a:defRPr/>
+            </a:pPr>
+            <a:r>
+              <a:rPr lang="en-US" b="1" dirty="0">
+                <a:solidFill>
+                  <a:srgbClr val="FF0000"/>
+                </a:solidFill>
+                <a:latin typeface="Rooney Regular" panose="020F0503040306060404" pitchFamily="34" charset="77"/>
+              </a:rPr>
+              <a:t>Model Benchmarking for the Multiclass Data</a:t>
+            </a:r>
           </a:p>
         </p:txBody>
       </p:sp>
@@ -18415,7 +18859,7 @@
         <p:spPr>
           <a:xfrm>
             <a:off x="567364" y="281567"/>
-            <a:ext cx="3488044" cy="738664"/>
+            <a:ext cx="5676682" cy="738664"/>
           </a:xfrm>
           <a:prstGeom prst="rect">
             <a:avLst/>
@@ -18435,7 +18879,7 @@
                 </a:solidFill>
                 <a:latin typeface="Avenir"/>
               </a:rPr>
-              <a:t>Feature Selection</a:t>
+              <a:t>Features Driving Negative Emotions</a:t>
             </a:r>
           </a:p>
           <a:p>
@@ -18657,7 +19101,7 @@
         <p:spPr>
           <a:xfrm>
             <a:off x="567364" y="281567"/>
-            <a:ext cx="3488044" cy="738664"/>
+            <a:ext cx="6477870" cy="738664"/>
           </a:xfrm>
           <a:prstGeom prst="rect">
             <a:avLst/>
@@ -18677,7 +19121,7 @@
                 </a:solidFill>
                 <a:latin typeface="Avenir"/>
               </a:rPr>
-              <a:t>Feature Selection</a:t>
+              <a:t>Feature Driving Positive Emotions</a:t>
             </a:r>
           </a:p>
           <a:p>
@@ -18893,8 +19337,8 @@
         </p:nvSpPr>
         <p:spPr>
           <a:xfrm>
-            <a:off x="6760983" y="1517007"/>
-            <a:ext cx="4858327" cy="5047536"/>
+            <a:off x="6760983" y="790783"/>
+            <a:ext cx="4858327" cy="5909310"/>
           </a:xfrm>
           <a:prstGeom prst="rect">
             <a:avLst/>
@@ -18906,6 +19350,81 @@
             <a:spAutoFit/>
           </a:bodyPr>
           <a:lstStyle/>
+          <a:p>
+            <a:pPr marL="285750" lvl="0" indent="-285750">
+              <a:buFont typeface="Arial" panose="020B0604020202020204" pitchFamily="34" charset="0"/>
+              <a:buChar char="•"/>
+              <a:defRPr/>
+            </a:pPr>
+            <a:endParaRPr lang="en-US" dirty="0"/>
+          </a:p>
+          <a:p>
+            <a:pPr lvl="0">
+              <a:defRPr/>
+            </a:pPr>
+            <a:endParaRPr lang="en-US" dirty="0"/>
+          </a:p>
+          <a:p>
+            <a:pPr marL="285750" lvl="0" indent="-285750">
+              <a:buFont typeface="Arial" panose="020B0604020202020204" pitchFamily="34" charset="0"/>
+              <a:buChar char="•"/>
+              <a:defRPr/>
+            </a:pPr>
+            <a:r>
+              <a:rPr lang="en-US" dirty="0"/>
+              <a:t>Real-Time Dashboard: Logistic Regression (~87% accuracy) can power a live dashboard for Marketing/Comms with trend alerts and CRM integration.</a:t>
+            </a:r>
+          </a:p>
+          <a:p>
+            <a:pPr marL="285750" lvl="0" indent="-285750">
+              <a:buFont typeface="Arial" panose="020B0604020202020204" pitchFamily="34" charset="0"/>
+              <a:buChar char="•"/>
+              <a:defRPr/>
+            </a:pPr>
+            <a:r>
+              <a:rPr lang="en-US" dirty="0"/>
+              <a:t>Product Feedback: Negatives = crashes &amp; usability; Positives = features &amp; freebies. Fix recurring issues, build on positives.</a:t>
+            </a:r>
+          </a:p>
+          <a:p>
+            <a:pPr marL="285750" lvl="0" indent="-285750">
+              <a:buFont typeface="Arial" panose="020B0604020202020204" pitchFamily="34" charset="0"/>
+              <a:buChar char="•"/>
+              <a:defRPr/>
+            </a:pPr>
+            <a:r>
+              <a:rPr lang="en-US" dirty="0"/>
+              <a:t>Customer Engagement: Track negative keywords (fail, hate, crash) and trigger alerts for proactive support.</a:t>
+            </a:r>
+          </a:p>
+          <a:p>
+            <a:pPr marL="285750" lvl="0" indent="-285750">
+              <a:buFont typeface="Arial" panose="020B0604020202020204" pitchFamily="34" charset="0"/>
+              <a:buChar char="•"/>
+              <a:defRPr/>
+            </a:pPr>
+            <a:r>
+              <a:rPr lang="en-US" dirty="0"/>
+              <a:t>Marketing Leverage: Amplify positive tweets (cool, great, awesome) via retweets, testimonials, influencer/hashtag campaigns.</a:t>
+            </a:r>
+          </a:p>
+          <a:p>
+            <a:pPr marL="285750" lvl="0" indent="-285750">
+              <a:buFont typeface="Arial" panose="020B0604020202020204" pitchFamily="34" charset="0"/>
+              <a:buChar char="•"/>
+              <a:defRPr/>
+            </a:pPr>
+            <a:r>
+              <a:rPr lang="en-US" dirty="0"/>
+              <a:t>Class Imbalance: Neutral dominates (~60%), Negative underrepresented (~16%). Add more labeled data and diversify sources (forums, app reviews).</a:t>
+            </a:r>
+          </a:p>
+          <a:p>
+            <a:pPr lvl="0">
+              <a:defRPr/>
+            </a:pPr>
+            <a:endParaRPr lang="en-US" dirty="0"/>
+          </a:p>
           <a:p>
             <a:pPr marL="285750" lvl="0" indent="-285750">
               <a:buFont typeface="Arial" panose="020B0604020202020204" pitchFamily="34" charset="0"/>
@@ -18938,121 +19457,16 @@
             </a:pPr>
             <a:r>
               <a:rPr lang="en-US" dirty="0"/>
-              <a:t>successfully built a sentiment analysis model to classify tweets about Apple and Google products. </a:t>
+              <a:t>Model: TF-IDF + Logistic Regression, Accuracy ~84%, F1 = 0.87.Strong on Positive sentiment, weak on Negative due to </a:t>
             </a:r>
-          </a:p>
-          <a:p>
-            <a:pPr marL="285750" lvl="0" indent="-285750">
-              <a:buFont typeface="Arial" panose="020B0604020202020204" pitchFamily="34" charset="0"/>
-              <a:buChar char="•"/>
-              <a:defRPr/>
-            </a:pPr>
+            <a:r>
+              <a:rPr lang="en-US" dirty="0" err="1"/>
+              <a:t>imbalance.Next</a:t>
+            </a:r>
             <a:r>
               <a:rPr lang="en-US" dirty="0"/>
-              <a:t>Using TF-IDF + Logistic Regression (with oversampling), the model achieved an accuracy of ~84% and a tuned F1-score of ~0.87.</a:t>
+              <a:t>: Improve Negative detection (SMOTE, deep learning), deploy dashboard/API, expand to other brands, integrate CRM alerts.</a:t>
             </a:r>
-          </a:p>
-          <a:p>
-            <a:pPr marL="285750" lvl="0" indent="-285750">
-              <a:buFont typeface="Arial" panose="020B0604020202020204" pitchFamily="34" charset="0"/>
-              <a:buChar char="•"/>
-              <a:defRPr/>
-            </a:pPr>
-            <a:r>
-              <a:rPr lang="en-US" dirty="0"/>
-              <a:t>The model performs very well on Positive tweets, but struggles with Negative sentiment detection due to class imbalance.</a:t>
-            </a:r>
-          </a:p>
-          <a:p>
-            <a:pPr marL="285750" lvl="0" indent="-285750">
-              <a:buFont typeface="Arial" panose="020B0604020202020204" pitchFamily="34" charset="0"/>
-              <a:buChar char="•"/>
-              <a:defRPr/>
-            </a:pPr>
-            <a:r>
-              <a:rPr lang="en-US" dirty="0"/>
-              <a:t>This highlights the importance of balancing datasets and focusing on underrepresented but critical signals.</a:t>
-            </a:r>
-          </a:p>
-          <a:p>
-            <a:pPr lvl="0">
-              <a:defRPr/>
-            </a:pPr>
-            <a:endParaRPr lang="en-US" dirty="0"/>
-          </a:p>
-          <a:p>
-            <a:pPr lvl="0">
-              <a:defRPr/>
-            </a:pPr>
-            <a:endParaRPr lang="en-US" dirty="0"/>
-          </a:p>
-          <a:p>
-            <a:pPr marL="285750" lvl="0" indent="-285750">
-              <a:buFont typeface="Arial" panose="020B0604020202020204" pitchFamily="34" charset="0"/>
-              <a:buChar char="•"/>
-              <a:defRPr/>
-            </a:pPr>
-            <a:endParaRPr lang="en-US" dirty="0"/>
-          </a:p>
-          <a:p>
-            <a:pPr marL="285750" lvl="0" indent="-285750">
-              <a:buFont typeface="Arial" panose="020B0604020202020204" pitchFamily="34" charset="0"/>
-              <a:buChar char="•"/>
-              <a:defRPr/>
-            </a:pPr>
-            <a:r>
-              <a:rPr lang="en-US" dirty="0"/>
-              <a:t>Improve classification of Negative tweets (SMOTE, deep learning).</a:t>
-            </a:r>
-          </a:p>
-          <a:p>
-            <a:pPr marL="285750" lvl="0" indent="-285750">
-              <a:buFont typeface="Arial" panose="020B0604020202020204" pitchFamily="34" charset="0"/>
-              <a:buChar char="•"/>
-              <a:defRPr/>
-            </a:pPr>
-            <a:r>
-              <a:rPr lang="en-US" dirty="0"/>
-              <a:t>Deploy as real-time dashboard or API.</a:t>
-            </a:r>
-          </a:p>
-          <a:p>
-            <a:pPr marL="285750" lvl="0" indent="-285750">
-              <a:buFont typeface="Arial" panose="020B0604020202020204" pitchFamily="34" charset="0"/>
-              <a:buChar char="•"/>
-              <a:defRPr/>
-            </a:pPr>
-            <a:r>
-              <a:rPr lang="en-US" dirty="0"/>
-              <a:t>Expand to other brands/industries.</a:t>
-            </a:r>
-          </a:p>
-          <a:p>
-            <a:pPr marL="285750" lvl="0" indent="-285750">
-              <a:buFont typeface="Arial" panose="020B0604020202020204" pitchFamily="34" charset="0"/>
-              <a:buChar char="•"/>
-              <a:defRPr/>
-            </a:pPr>
-            <a:r>
-              <a:rPr lang="en-US" dirty="0"/>
-              <a:t>Integrate with CRM for automated alerts.</a:t>
-            </a:r>
-          </a:p>
-          <a:p>
-            <a:pPr marL="285750" lvl="0" indent="-285750">
-              <a:buFont typeface="Arial" panose="020B0604020202020204" pitchFamily="34" charset="0"/>
-              <a:buChar char="•"/>
-              <a:defRPr/>
-            </a:pPr>
-            <a:endParaRPr lang="en-US" dirty="0"/>
-          </a:p>
-          <a:p>
-            <a:pPr marL="285750" lvl="0" indent="-285750">
-              <a:buFont typeface="Arial" panose="020B0604020202020204" pitchFamily="34" charset="0"/>
-              <a:buChar char="•"/>
-              <a:defRPr/>
-            </a:pPr>
-            <a:endParaRPr lang="en-US" dirty="0"/>
           </a:p>
         </p:txBody>
       </p:sp>
@@ -19107,7 +19521,7 @@
         </p:nvSpPr>
         <p:spPr>
           <a:xfrm>
-            <a:off x="6769961" y="1794006"/>
+            <a:off x="6760983" y="790783"/>
             <a:ext cx="4733581" cy="307777"/>
           </a:xfrm>
           <a:prstGeom prst="roundRect">
@@ -19202,7 +19616,7 @@
         </p:nvSpPr>
         <p:spPr>
           <a:xfrm>
-            <a:off x="6885729" y="4602329"/>
+            <a:off x="6885729" y="4792936"/>
             <a:ext cx="4733581" cy="307777"/>
           </a:xfrm>
           <a:prstGeom prst="roundRect">
@@ -19257,7 +19671,7 @@
               <a:defRPr/>
             </a:pPr>
             <a:r>
-              <a:rPr kumimoji="0" lang="en-US" sz="1400" b="1" i="0" u="none" strike="noStrike" kern="0" cap="none" spc="0" normalizeH="0" baseline="0" noProof="0">
+              <a:rPr kumimoji="0" lang="en-US" sz="1400" b="1" i="0" u="none" strike="noStrike" kern="0" cap="none" spc="0" normalizeH="0" baseline="0" noProof="0" dirty="0">
                 <a:ln>
                   <a:noFill/>
                 </a:ln>
@@ -19274,21 +19688,6 @@
               </a:rPr>
               <a:t>Recommendations</a:t>
             </a:r>
-            <a:endParaRPr kumimoji="0" lang="en-US" sz="1400" b="1" i="0" u="none" strike="noStrike" kern="0" cap="none" spc="0" normalizeH="0" baseline="0" noProof="0" dirty="0">
-              <a:ln>
-                <a:noFill/>
-              </a:ln>
-              <a:solidFill>
-                <a:srgbClr val="FF0000"/>
-              </a:solidFill>
-              <a:effectLst/>
-              <a:uLnTx/>
-              <a:uFillTx/>
-              <a:latin typeface="Rooney Regular" panose="020F0503040306060404" pitchFamily="34" charset="77"/>
-              <a:ea typeface="+mn-ea"/>
-              <a:cs typeface="+mn-cs"/>
-              <a:sym typeface="Arial"/>
-            </a:endParaRPr>
           </a:p>
         </p:txBody>
       </p:sp>
@@ -19307,7 +19706,7 @@
         <p:spPr>
           <a:xfrm>
             <a:off x="548639" y="2521819"/>
-            <a:ext cx="4271897" cy="1815882"/>
+            <a:ext cx="4271897" cy="1600438"/>
           </a:xfrm>
           <a:prstGeom prst="rect">
             <a:avLst/>
@@ -19374,18 +19773,7 @@
             </a:pPr>
             <a:r>
               <a:rPr lang="en-US" dirty="0"/>
-              <a:t>Neutral signals: link, cool, update.</a:t>
-            </a:r>
-          </a:p>
-          <a:p>
-            <a:pPr marL="285750" lvl="0" indent="-285750">
-              <a:buFont typeface="Arial" panose="020B0604020202020204" pitchFamily="34" charset="0"/>
-              <a:buChar char="•"/>
-              <a:defRPr/>
-            </a:pPr>
-            <a:r>
-              <a:rPr lang="en-US" dirty="0"/>
-              <a:t>Model strong on Neutral &amp; Positive; weaker on Negative class</a:t>
+              <a:t>Model strong on Positive and weaker on Negative class</a:t>
             </a:r>
           </a:p>
           <a:p>
@@ -19407,6 +19795,369 @@
 </file>
 
 <file path=ppt/slides/slide14.xml><?xml version="1.0" encoding="utf-8"?>
+<p:sld xmlns:a="http://schemas.openxmlformats.org/drawingml/2006/main" xmlns:r="http://schemas.openxmlformats.org/officeDocument/2006/relationships" xmlns:p="http://schemas.openxmlformats.org/presentationml/2006/main">
+  <p:cSld>
+    <p:spTree>
+      <p:nvGrpSpPr>
+        <p:cNvPr id="1" name="Shape 148">
+          <a:extLst>
+            <a:ext uri="{FF2B5EF4-FFF2-40B4-BE49-F238E27FC236}">
+              <a16:creationId xmlns:a16="http://schemas.microsoft.com/office/drawing/2014/main" id="{FACBFA9D-EA05-C834-1D6A-9D6D28793802}"/>
+            </a:ext>
+          </a:extLst>
+        </p:cNvPr>
+        <p:cNvGrpSpPr/>
+        <p:nvPr/>
+      </p:nvGrpSpPr>
+      <p:grpSpPr>
+        <a:xfrm>
+          <a:off x="0" y="0"/>
+          <a:ext cx="0" cy="0"/>
+          <a:chOff x="0" y="0"/>
+          <a:chExt cx="0" cy="0"/>
+        </a:xfrm>
+      </p:grpSpPr>
+      <p:sp>
+        <p:nvSpPr>
+          <p:cNvPr id="149" name="Google Shape;149;p28">
+            <a:extLst>
+              <a:ext uri="{FF2B5EF4-FFF2-40B4-BE49-F238E27FC236}">
+                <a16:creationId xmlns:a16="http://schemas.microsoft.com/office/drawing/2014/main" id="{ED2F84C7-E4CD-814F-B393-FFE0CE173DDF}"/>
+              </a:ext>
+            </a:extLst>
+          </p:cNvPr>
+          <p:cNvSpPr/>
+          <p:nvPr/>
+        </p:nvSpPr>
+        <p:spPr>
+          <a:xfrm>
+            <a:off x="222408" y="201692"/>
+            <a:ext cx="11747184" cy="6301103"/>
+          </a:xfrm>
+          <a:prstGeom prst="rect">
+            <a:avLst/>
+          </a:prstGeom>
+          <a:solidFill>
+            <a:srgbClr val="FF481D"/>
+          </a:solidFill>
+          <a:ln>
+            <a:noFill/>
+          </a:ln>
+        </p:spPr>
+        <p:txBody>
+          <a:bodyPr spcFirstLastPara="1" wrap="square" lIns="91425" tIns="91425" rIns="91425" bIns="91425" anchor="ctr" anchorCtr="0">
+            <a:noAutofit/>
+          </a:bodyPr>
+          <a:lstStyle/>
+          <a:p>
+            <a:pPr marL="0" marR="0" lvl="0" indent="0" algn="l" defTabSz="914400" rtl="0" eaLnBrk="1" fontAlgn="auto" latinLnBrk="0" hangingPunct="1">
+              <a:lnSpc>
+                <a:spcPct val="100000"/>
+              </a:lnSpc>
+              <a:spcBef>
+                <a:spcPts val="0"/>
+              </a:spcBef>
+              <a:spcAft>
+                <a:spcPts val="0"/>
+              </a:spcAft>
+              <a:buClr>
+                <a:srgbClr val="000000"/>
+              </a:buClr>
+              <a:buSzPts val="1800"/>
+              <a:buFont typeface="Arial"/>
+              <a:buNone/>
+              <a:tabLst/>
+              <a:defRPr/>
+            </a:pPr>
+            <a:endParaRPr kumimoji="0" sz="1800" b="0" i="0" u="none" strike="noStrike" kern="0" cap="none" spc="0" normalizeH="0" baseline="0" noProof="0">
+              <a:ln>
+                <a:noFill/>
+              </a:ln>
+              <a:solidFill>
+                <a:srgbClr val="FFFFFF"/>
+              </a:solidFill>
+              <a:effectLst/>
+              <a:uLnTx/>
+              <a:uFillTx/>
+              <a:latin typeface="Avenir"/>
+              <a:ea typeface="Avenir"/>
+              <a:cs typeface="Avenir"/>
+              <a:sym typeface="Avenir"/>
+            </a:endParaRPr>
+          </a:p>
+          <a:p>
+            <a:pPr marL="0" marR="0" lvl="0" indent="0" algn="l" defTabSz="914400" rtl="0" eaLnBrk="1" fontAlgn="auto" latinLnBrk="0" hangingPunct="1">
+              <a:lnSpc>
+                <a:spcPct val="100000"/>
+              </a:lnSpc>
+              <a:spcBef>
+                <a:spcPts val="0"/>
+              </a:spcBef>
+              <a:spcAft>
+                <a:spcPts val="0"/>
+              </a:spcAft>
+              <a:buClr>
+                <a:srgbClr val="000000"/>
+              </a:buClr>
+              <a:buSzPts val="1800"/>
+              <a:buFont typeface="Arial"/>
+              <a:buNone/>
+              <a:tabLst/>
+              <a:defRPr/>
+            </a:pPr>
+            <a:endParaRPr kumimoji="0" sz="1800" b="0" i="0" u="none" strike="noStrike" kern="0" cap="none" spc="0" normalizeH="0" baseline="0" noProof="0">
+              <a:ln>
+                <a:noFill/>
+              </a:ln>
+              <a:solidFill>
+                <a:srgbClr val="FFFFFF"/>
+              </a:solidFill>
+              <a:effectLst/>
+              <a:uLnTx/>
+              <a:uFillTx/>
+              <a:latin typeface="Avenir"/>
+              <a:ea typeface="Avenir"/>
+              <a:cs typeface="Avenir"/>
+              <a:sym typeface="Avenir"/>
+            </a:endParaRPr>
+          </a:p>
+        </p:txBody>
+      </p:sp>
+      <p:grpSp>
+        <p:nvGrpSpPr>
+          <p:cNvPr id="150" name="Google Shape;150;p28">
+            <a:extLst>
+              <a:ext uri="{FF2B5EF4-FFF2-40B4-BE49-F238E27FC236}">
+                <a16:creationId xmlns:a16="http://schemas.microsoft.com/office/drawing/2014/main" id="{3CB2243F-B090-DCAA-5568-11465D52A3B1}"/>
+              </a:ext>
+            </a:extLst>
+          </p:cNvPr>
+          <p:cNvGrpSpPr/>
+          <p:nvPr/>
+        </p:nvGrpSpPr>
+        <p:grpSpPr>
+          <a:xfrm>
+            <a:off x="1084372" y="1456178"/>
+            <a:ext cx="9008335" cy="1972822"/>
+            <a:chOff x="401275" y="228352"/>
+            <a:chExt cx="5065835" cy="1850031"/>
+          </a:xfrm>
+        </p:grpSpPr>
+        <p:sp>
+          <p:nvSpPr>
+            <p:cNvPr id="151" name="Google Shape;151;p28">
+              <a:extLst>
+                <a:ext uri="{FF2B5EF4-FFF2-40B4-BE49-F238E27FC236}">
+                  <a16:creationId xmlns:a16="http://schemas.microsoft.com/office/drawing/2014/main" id="{5B6DD8FC-8529-9BD7-D995-0D5E32053E9E}"/>
+                </a:ext>
+              </a:extLst>
+            </p:cNvPr>
+            <p:cNvSpPr txBox="1"/>
+            <p:nvPr/>
+          </p:nvSpPr>
+          <p:spPr>
+            <a:xfrm>
+              <a:off x="401275" y="228352"/>
+              <a:ext cx="4888355" cy="663789"/>
+            </a:xfrm>
+            <a:prstGeom prst="rect">
+              <a:avLst/>
+            </a:prstGeom>
+            <a:noFill/>
+            <a:ln>
+              <a:noFill/>
+            </a:ln>
+          </p:spPr>
+          <p:txBody>
+            <a:bodyPr spcFirstLastPara="1" wrap="square" lIns="91425" tIns="45700" rIns="91425" bIns="45700" anchor="t" anchorCtr="0">
+              <a:spAutoFit/>
+            </a:bodyPr>
+            <a:lstStyle/>
+            <a:p>
+              <a:pPr marL="0" marR="0" lvl="0" indent="0" algn="ctr" defTabSz="914400" rtl="0" eaLnBrk="1" fontAlgn="auto" latinLnBrk="0" hangingPunct="1">
+                <a:lnSpc>
+                  <a:spcPct val="100000"/>
+                </a:lnSpc>
+                <a:spcBef>
+                  <a:spcPts val="0"/>
+                </a:spcBef>
+                <a:spcAft>
+                  <a:spcPts val="0"/>
+                </a:spcAft>
+                <a:buClr>
+                  <a:srgbClr val="FFFFFF"/>
+                </a:buClr>
+                <a:buSzPts val="4000"/>
+                <a:buFont typeface="Avenir"/>
+                <a:buNone/>
+                <a:tabLst/>
+                <a:defRPr/>
+              </a:pPr>
+              <a:r>
+                <a:rPr lang="en-US" sz="4000" b="1" dirty="0">
+                  <a:solidFill>
+                    <a:srgbClr val="FFFFFF"/>
+                  </a:solidFill>
+                  <a:latin typeface="Avenir"/>
+                  <a:ea typeface="Avenir"/>
+                  <a:cs typeface="Avenir"/>
+                  <a:sym typeface="Avenir"/>
+                </a:rPr>
+                <a:t>Model Deployment</a:t>
+              </a:r>
+              <a:endParaRPr kumimoji="0" sz="1400" b="1" i="0" u="none" strike="noStrike" kern="0" cap="none" spc="0" normalizeH="0" baseline="0" noProof="0" dirty="0">
+                <a:ln>
+                  <a:noFill/>
+                </a:ln>
+                <a:solidFill>
+                  <a:srgbClr val="F64D18"/>
+                </a:solidFill>
+                <a:effectLst/>
+                <a:uLnTx/>
+                <a:uFillTx/>
+                <a:latin typeface="Avenir"/>
+                <a:ea typeface="Avenir"/>
+                <a:cs typeface="Avenir"/>
+                <a:sym typeface="Avenir"/>
+              </a:endParaRPr>
+            </a:p>
+          </p:txBody>
+        </p:sp>
+        <p:sp>
+          <p:nvSpPr>
+            <p:cNvPr id="152" name="Google Shape;152;p28">
+              <a:extLst>
+                <a:ext uri="{FF2B5EF4-FFF2-40B4-BE49-F238E27FC236}">
+                  <a16:creationId xmlns:a16="http://schemas.microsoft.com/office/drawing/2014/main" id="{BD9E6A08-8581-3383-E061-45AD1B650E61}"/>
+                </a:ext>
+              </a:extLst>
+            </p:cNvPr>
+            <p:cNvSpPr txBox="1"/>
+            <p:nvPr/>
+          </p:nvSpPr>
+          <p:spPr>
+            <a:xfrm>
+              <a:off x="401275" y="1760939"/>
+              <a:ext cx="5065835" cy="317444"/>
+            </a:xfrm>
+            <a:prstGeom prst="rect">
+              <a:avLst/>
+            </a:prstGeom>
+            <a:noFill/>
+            <a:ln>
+              <a:noFill/>
+            </a:ln>
+          </p:spPr>
+          <p:txBody>
+            <a:bodyPr spcFirstLastPara="1" wrap="square" lIns="91425" tIns="45700" rIns="91425" bIns="45700" anchor="t" anchorCtr="0">
+              <a:spAutoFit/>
+            </a:bodyPr>
+            <a:lstStyle/>
+            <a:p>
+              <a:pPr>
+                <a:buClr>
+                  <a:schemeClr val="bg1"/>
+                </a:buClr>
+                <a:defRPr sz="1800">
+                  <a:solidFill>
+                    <a:srgbClr val="000000"/>
+                  </a:solidFill>
+                </a:defRPr>
+              </a:pPr>
+              <a:endParaRPr kumimoji="0" sz="1600" b="0" i="0" u="none" strike="noStrike" kern="0" cap="none" spc="0" normalizeH="0" baseline="0" noProof="0" dirty="0">
+                <a:ln>
+                  <a:noFill/>
+                </a:ln>
+                <a:solidFill>
+                  <a:srgbClr val="FFFFFF"/>
+                </a:solidFill>
+                <a:effectLst/>
+                <a:uLnTx/>
+                <a:uFillTx/>
+                <a:latin typeface="Avenir"/>
+                <a:ea typeface="Avenir"/>
+                <a:cs typeface="Avenir"/>
+                <a:sym typeface="Avenir"/>
+              </a:endParaRPr>
+            </a:p>
+          </p:txBody>
+        </p:sp>
+      </p:grpSp>
+      <p:sp>
+        <p:nvSpPr>
+          <p:cNvPr id="3" name="TextBox 2">
+            <a:extLst>
+              <a:ext uri="{FF2B5EF4-FFF2-40B4-BE49-F238E27FC236}">
+                <a16:creationId xmlns:a16="http://schemas.microsoft.com/office/drawing/2014/main" id="{16C632AC-BF40-C941-B2EF-A1711436EADD}"/>
+              </a:ext>
+            </a:extLst>
+          </p:cNvPr>
+          <p:cNvSpPr txBox="1"/>
+          <p:nvPr/>
+        </p:nvSpPr>
+        <p:spPr>
+          <a:xfrm>
+            <a:off x="3048000" y="3277289"/>
+            <a:ext cx="7167154" cy="307777"/>
+          </a:xfrm>
+          <a:prstGeom prst="rect">
+            <a:avLst/>
+          </a:prstGeom>
+          <a:noFill/>
+        </p:spPr>
+        <p:txBody>
+          <a:bodyPr wrap="square">
+            <a:spAutoFit/>
+          </a:bodyPr>
+          <a:lstStyle/>
+          <a:p>
+            <a:r>
+              <a:rPr lang="en-US" dirty="0">
+                <a:solidFill>
+                  <a:schemeClr val="bg1"/>
+                </a:solidFill>
+              </a:rPr>
+              <a:t>Link to the model:  </a:t>
+            </a:r>
+            <a:r>
+              <a:rPr lang="en-US" b="0" i="0" u="sng" dirty="0">
+                <a:solidFill>
+                  <a:schemeClr val="bg1"/>
+                </a:solidFill>
+                <a:effectLst/>
+                <a:latin typeface="-apple-system"/>
+                <a:hlinkClick r:id="rId3">
+                  <a:extLst>
+                    <a:ext uri="{A12FA001-AC4F-418D-AE19-62706E023703}">
+                      <ahyp:hlinkClr xmlns:ahyp="http://schemas.microsoft.com/office/drawing/2018/hyperlinkcolor" val="tx"/>
+                    </a:ext>
+                  </a:extLst>
+                </a:hlinkClick>
+              </a:rPr>
+              <a:t>https://group-3-project-app-46ae69b19de0.herokuapp.com/</a:t>
+            </a:r>
+            <a:endParaRPr lang="en-KE" dirty="0">
+              <a:solidFill>
+                <a:schemeClr val="bg1"/>
+              </a:solidFill>
+            </a:endParaRPr>
+          </a:p>
+        </p:txBody>
+      </p:sp>
+    </p:spTree>
+    <p:extLst>
+      <p:ext uri="{BB962C8B-B14F-4D97-AF65-F5344CB8AC3E}">
+        <p14:creationId xmlns:p14="http://schemas.microsoft.com/office/powerpoint/2010/main" val="4285166009"/>
+      </p:ext>
+    </p:extLst>
+  </p:cSld>
+  <p:clrMapOvr>
+    <a:masterClrMapping/>
+  </p:clrMapOvr>
+</p:sld>
+</file>
+
+<file path=ppt/slides/slide15.xml><?xml version="1.0" encoding="utf-8"?>
 <p:sld xmlns:a="http://schemas.openxmlformats.org/drawingml/2006/main" xmlns:r="http://schemas.openxmlformats.org/officeDocument/2006/relationships" xmlns:p="http://schemas.openxmlformats.org/presentationml/2006/main">
   <p:cSld>
     <p:spTree>
@@ -19501,7 +20252,7 @@
         </p:nvSpPr>
         <p:spPr>
           <a:xfrm>
-            <a:off x="9463177" y="5184475"/>
+            <a:off x="9690339" y="5314115"/>
             <a:ext cx="2501661" cy="1380227"/>
           </a:xfrm>
           <a:prstGeom prst="rect">
@@ -19518,6 +20269,95 @@
           <a:lstStyle/>
           <a:p>
             <a:endParaRPr lang="en-KE" dirty="0"/>
+          </a:p>
+        </p:txBody>
+      </p:sp>
+      <p:sp>
+        <p:nvSpPr>
+          <p:cNvPr id="4" name="TextBox 3">
+            <a:extLst>
+              <a:ext uri="{FF2B5EF4-FFF2-40B4-BE49-F238E27FC236}">
+                <a16:creationId xmlns:a16="http://schemas.microsoft.com/office/drawing/2014/main" id="{110C4C67-06C1-89E4-36B3-7686ADE42D97}"/>
+              </a:ext>
+            </a:extLst>
+          </p:cNvPr>
+          <p:cNvSpPr txBox="1"/>
+          <p:nvPr/>
+        </p:nvSpPr>
+        <p:spPr>
+          <a:xfrm>
+            <a:off x="9204547" y="4907918"/>
+            <a:ext cx="2743611" cy="1384995"/>
+          </a:xfrm>
+          <a:prstGeom prst="rect">
+            <a:avLst/>
+          </a:prstGeom>
+          <a:noFill/>
+        </p:spPr>
+        <p:txBody>
+          <a:bodyPr wrap="square" rtlCol="0">
+            <a:spAutoFit/>
+          </a:bodyPr>
+          <a:lstStyle/>
+          <a:p>
+            <a:pPr lvl="0"/>
+            <a:r>
+              <a:rPr lang="en-ZA" b="1" dirty="0">
+                <a:solidFill>
+                  <a:srgbClr val="FF461E"/>
+                </a:solidFill>
+                <a:latin typeface="Rooney Regular" panose="020F0503040306060404" pitchFamily="34" charset="77"/>
+                <a:sym typeface="Merriweather"/>
+                <a:hlinkClick r:id="rId2"/>
+              </a:rPr>
+              <a:t>erastus@gmail.com lucianandanu9@gmail.com</a:t>
+            </a:r>
+            <a:endParaRPr lang="en-ZA" b="1" dirty="0">
+              <a:solidFill>
+                <a:srgbClr val="FF461E"/>
+              </a:solidFill>
+              <a:latin typeface="Rooney Regular" panose="020F0503040306060404" pitchFamily="34" charset="77"/>
+              <a:sym typeface="Merriweather"/>
+            </a:endParaRPr>
+          </a:p>
+          <a:p>
+            <a:pPr lvl="0"/>
+            <a:r>
+              <a:rPr lang="en-US" b="1" dirty="0">
+                <a:hlinkClick r:id="rId3"/>
+              </a:rPr>
+              <a:t>irenekibengo@gmail.com</a:t>
+            </a:r>
+            <a:endParaRPr lang="en-US" b="1" dirty="0"/>
+          </a:p>
+          <a:p>
+            <a:pPr lvl="0"/>
+            <a:r>
+              <a:rPr lang="en-US" b="1" dirty="0">
+                <a:hlinkClick r:id="rId4"/>
+              </a:rPr>
+              <a:t>bensonmwihia@gmail.com</a:t>
+            </a:r>
+          </a:p>
+          <a:p>
+            <a:pPr lvl="0"/>
+            <a:r>
+              <a:rPr lang="en-US" b="1" dirty="0">
+                <a:hlinkClick r:id="rId4"/>
+              </a:rPr>
+              <a:t>danakwabi@gmail.com</a:t>
+            </a:r>
+            <a:endParaRPr lang="en-US" b="1" dirty="0"/>
+          </a:p>
+          <a:p>
+            <a:pPr lvl="0"/>
+            <a:r>
+              <a:rPr lang="en-US" b="1" dirty="0">
+                <a:hlinkClick r:id="rId5"/>
+              </a:rPr>
+              <a:t>sydneywere563@gmail.com</a:t>
+            </a:r>
+            <a:endParaRPr lang="en-US" b="1" dirty="0"/>
           </a:p>
         </p:txBody>
       </p:sp>
@@ -27076,7 +27916,7 @@
             </a:pPr>
             <a:r>
               <a:rPr lang="en-US" dirty="0"/>
-              <a:t>Feature Extraction: TF-IDF with up to 5,000 n-grams.</a:t>
+              <a:t>Feature Extraction.</a:t>
             </a:r>
           </a:p>
           <a:p>
@@ -27332,9 +28172,9 @@
         <p:grpSpPr>
           <a:xfrm>
             <a:off x="431229" y="278449"/>
-            <a:ext cx="5367429" cy="4013177"/>
+            <a:ext cx="5367429" cy="2782071"/>
             <a:chOff x="401275" y="228352"/>
-            <a:chExt cx="5065835" cy="3673906"/>
+            <a:chExt cx="5065835" cy="2546876"/>
           </a:xfrm>
         </p:grpSpPr>
         <p:sp>
@@ -27411,7 +28251,7 @@
           <p:spPr>
             <a:xfrm>
               <a:off x="401275" y="1760939"/>
-              <a:ext cx="5065835" cy="2141319"/>
+              <a:ext cx="5065835" cy="1014289"/>
             </a:xfrm>
             <a:prstGeom prst="rect">
               <a:avLst/>
@@ -27546,105 +28386,6 @@
                 </a:rPr>
                 <a:t>Negative underrepresented → detection harder.</a:t>
               </a:r>
-            </a:p>
-            <a:p>
-              <a:pPr marL="285750" marR="0" lvl="0" indent="-285750" algn="l" rtl="0">
-                <a:lnSpc>
-                  <a:spcPct val="100000"/>
-                </a:lnSpc>
-                <a:spcBef>
-                  <a:spcPts val="0"/>
-                </a:spcBef>
-                <a:spcAft>
-                  <a:spcPts val="0"/>
-                </a:spcAft>
-                <a:buClr>
-                  <a:srgbClr val="F2F2F2"/>
-                </a:buClr>
-                <a:buSzPts val="1600"/>
-                <a:buFont typeface="Arial" panose="020B0604020202020204" pitchFamily="34" charset="0"/>
-                <a:buChar char="•"/>
-              </a:pPr>
-              <a:r>
-                <a:rPr lang="en-US" sz="1600" i="0" u="none" strike="noStrike" cap="none" dirty="0">
-                  <a:solidFill>
-                    <a:schemeClr val="lt1"/>
-                  </a:solidFill>
-                  <a:latin typeface="Avenir Next" panose="020B0503020202020204"/>
-                  <a:ea typeface="Avenir"/>
-                  <a:cs typeface="Avenir"/>
-                  <a:sym typeface="Avenir"/>
-                </a:rPr>
-                <a:t>Business Value: real-time monitoring, risk detection, marketing insights.</a:t>
-              </a:r>
-            </a:p>
-            <a:p>
-              <a:pPr marL="285750" marR="0" lvl="0" indent="-285750" algn="l" rtl="0">
-                <a:lnSpc>
-                  <a:spcPct val="100000"/>
-                </a:lnSpc>
-                <a:spcBef>
-                  <a:spcPts val="0"/>
-                </a:spcBef>
-                <a:spcAft>
-                  <a:spcPts val="0"/>
-                </a:spcAft>
-                <a:buClr>
-                  <a:srgbClr val="F2F2F2"/>
-                </a:buClr>
-                <a:buSzPts val="1600"/>
-                <a:buFont typeface="Arial" panose="020B0604020202020204" pitchFamily="34" charset="0"/>
-                <a:buChar char="•"/>
-              </a:pPr>
-              <a:r>
-                <a:rPr lang="en-US" sz="1600" i="0" u="none" strike="noStrike" cap="none" dirty="0">
-                  <a:solidFill>
-                    <a:schemeClr val="lt1"/>
-                  </a:solidFill>
-                  <a:latin typeface="Avenir Next" panose="020B0503020202020204"/>
-                  <a:ea typeface="Avenir"/>
-                  <a:cs typeface="Avenir"/>
-                  <a:sym typeface="Avenir"/>
-                </a:rPr>
-                <a:t>Recommendations: improve Negative detection, deploy dashboard/API, extend scope.</a:t>
-              </a:r>
-              <a:endParaRPr lang="en-US" sz="1600" dirty="0">
-                <a:solidFill>
-                  <a:schemeClr val="lt1"/>
-                </a:solidFill>
-                <a:latin typeface="Avenir"/>
-                <a:ea typeface="Avenir"/>
-                <a:cs typeface="Avenir"/>
-                <a:sym typeface="Avenir"/>
-              </a:endParaRPr>
-            </a:p>
-            <a:p>
-              <a:pPr marL="285750" marR="0" lvl="0" indent="-285750" algn="l" rtl="0">
-                <a:lnSpc>
-                  <a:spcPct val="100000"/>
-                </a:lnSpc>
-                <a:spcBef>
-                  <a:spcPts val="0"/>
-                </a:spcBef>
-                <a:spcAft>
-                  <a:spcPts val="0"/>
-                </a:spcAft>
-                <a:buClr>
-                  <a:srgbClr val="F2F2F2"/>
-                </a:buClr>
-                <a:buSzPts val="1600"/>
-                <a:buFont typeface="Arial" panose="020B0604020202020204" pitchFamily="34" charset="0"/>
-                <a:buChar char="•"/>
-              </a:pPr>
-              <a:endParaRPr lang="en-US" sz="1600" i="0" u="none" strike="noStrike" cap="none" dirty="0">
-                <a:solidFill>
-                  <a:schemeClr val="lt1"/>
-                </a:solidFill>
-                <a:latin typeface="Avenir Next" panose="020B0503020202020204"/>
-                <a:ea typeface="Avenir"/>
-                <a:cs typeface="Avenir"/>
-                <a:sym typeface="Avenir"/>
-              </a:endParaRPr>
             </a:p>
           </p:txBody>
         </p:sp>
@@ -28940,7 +29681,7 @@
         <p:spPr>
           <a:xfrm>
             <a:off x="442660" y="1058779"/>
-            <a:ext cx="3561347" cy="523220"/>
+            <a:ext cx="4320929" cy="523220"/>
           </a:xfrm>
           <a:prstGeom prst="rect">
             <a:avLst/>
@@ -28960,7 +29701,7 @@
                 </a:solidFill>
                 <a:latin typeface="Avenir"/>
               </a:rPr>
-              <a:t>Modelling</a:t>
+              <a:t>Modelling For Binary Data</a:t>
             </a:r>
             <a:endParaRPr lang="en-KE" sz="2800" dirty="0">
               <a:solidFill>
@@ -29154,7 +29895,7 @@
         </p:blipFill>
         <p:spPr>
           <a:xfrm>
-            <a:off x="442660" y="2225612"/>
+            <a:off x="442660" y="1859317"/>
             <a:ext cx="4705592" cy="2406774"/>
           </a:xfrm>
           <a:prstGeom prst="rect">
@@ -29192,6 +29933,126 @@
           </a:prstGeom>
         </p:spPr>
       </p:pic>
+      <p:sp>
+        <p:nvSpPr>
+          <p:cNvPr id="5" name="TextBox 4">
+            <a:extLst>
+              <a:ext uri="{FF2B5EF4-FFF2-40B4-BE49-F238E27FC236}">
+                <a16:creationId xmlns:a16="http://schemas.microsoft.com/office/drawing/2014/main" id="{02384A80-0216-2DD8-5CE0-CEEBDC8CB353}"/>
+              </a:ext>
+            </a:extLst>
+          </p:cNvPr>
+          <p:cNvSpPr txBox="1"/>
+          <p:nvPr/>
+        </p:nvSpPr>
+        <p:spPr>
+          <a:xfrm>
+            <a:off x="442660" y="1058779"/>
+            <a:ext cx="4799900" cy="523220"/>
+          </a:xfrm>
+          <a:prstGeom prst="rect">
+            <a:avLst/>
+          </a:prstGeom>
+          <a:noFill/>
+        </p:spPr>
+        <p:txBody>
+          <a:bodyPr wrap="square" rtlCol="0">
+            <a:spAutoFit/>
+          </a:bodyPr>
+          <a:lstStyle/>
+          <a:p>
+            <a:r>
+              <a:rPr lang="en-US" sz="2800" dirty="0">
+                <a:solidFill>
+                  <a:srgbClr val="272A2A"/>
+                </a:solidFill>
+                <a:latin typeface="Avenir"/>
+              </a:rPr>
+              <a:t>Modelling For Multiclass Data</a:t>
+            </a:r>
+            <a:endParaRPr lang="en-KE" sz="2800" dirty="0">
+              <a:solidFill>
+                <a:srgbClr val="272A2A"/>
+              </a:solidFill>
+              <a:latin typeface="Avenir"/>
+            </a:endParaRPr>
+          </a:p>
+        </p:txBody>
+      </p:sp>
+      <p:sp>
+        <p:nvSpPr>
+          <p:cNvPr id="2" name="TextBox 1">
+            <a:extLst>
+              <a:ext uri="{FF2B5EF4-FFF2-40B4-BE49-F238E27FC236}">
+                <a16:creationId xmlns:a16="http://schemas.microsoft.com/office/drawing/2014/main" id="{B040A0EB-275C-DF6B-24CE-898AEBC80FE6}"/>
+              </a:ext>
+            </a:extLst>
+          </p:cNvPr>
+          <p:cNvSpPr txBox="1"/>
+          <p:nvPr/>
+        </p:nvSpPr>
+        <p:spPr>
+          <a:xfrm>
+            <a:off x="267568" y="4392956"/>
+            <a:ext cx="6083085" cy="2031325"/>
+          </a:xfrm>
+          <a:prstGeom prst="rect">
+            <a:avLst/>
+          </a:prstGeom>
+          <a:noFill/>
+        </p:spPr>
+        <p:txBody>
+          <a:bodyPr wrap="square" rtlCol="0">
+            <a:spAutoFit/>
+          </a:bodyPr>
+          <a:lstStyle/>
+          <a:p>
+            <a:r>
+              <a:rPr lang="en-US" dirty="0"/>
+              <a:t>Accuracy = 68% </a:t>
+            </a:r>
+          </a:p>
+          <a:p>
+            <a:endParaRPr lang="en-US" dirty="0"/>
+          </a:p>
+          <a:p>
+            <a:r>
+              <a:rPr lang="en-US" b="1" dirty="0"/>
+              <a:t>Per-Class Metrics</a:t>
+            </a:r>
+          </a:p>
+          <a:p>
+            <a:r>
+              <a:rPr lang="en-US" b="1" dirty="0"/>
+              <a:t>Negative</a:t>
+            </a:r>
+            <a:r>
+              <a:rPr lang="en-US" dirty="0"/>
+              <a:t>: F1 = 0.43 → weakest, poor precision/recall due to low support (114).</a:t>
+            </a:r>
+          </a:p>
+          <a:p>
+            <a:r>
+              <a:rPr lang="en-US" b="1" dirty="0"/>
+              <a:t>Positive</a:t>
+            </a:r>
+            <a:r>
+              <a:rPr lang="en-US" dirty="0"/>
+              <a:t>: F1 = 0.61 → moderate, fair balance of precision/recall (596 examples).</a:t>
+            </a:r>
+          </a:p>
+          <a:p>
+            <a:r>
+              <a:rPr lang="en-US" b="1" dirty="0"/>
+              <a:t>Neutral</a:t>
+            </a:r>
+            <a:r>
+              <a:rPr lang="en-US" dirty="0"/>
+              <a:t>: F1 = 0.74 → strongest, benefits from majority class size (1109 examples).</a:t>
+            </a:r>
+          </a:p>
+        </p:txBody>
+      </p:sp>
     </p:spTree>
     <p:extLst>
       <p:ext uri="{BB962C8B-B14F-4D97-AF65-F5344CB8AC3E}">

</xml_diff>